<commit_message>
Updates slides to prep for Informatica
Updates to screenshots for latest Chef Automate
Adds a screenshots directory
Minor content updates after MSP event

Signed-off-by: Nathen Harvey <nharvey@chef.io>
</commit_message>
<xml_diff>
--- a/powerpoint/Learning-Lab.pptx
+++ b/powerpoint/Learning-Lab.pptx
@@ -7,24 +7,25 @@
     <p:sldMasterId id="2147483960" r:id="rId3"/>
   </p:sldMasterIdLst>
   <p:notesMasterIdLst>
-    <p:notesMasterId r:id="rId19"/>
+    <p:notesMasterId r:id="rId20"/>
   </p:notesMasterIdLst>
   <p:sldIdLst>
-    <p:sldId id="274" r:id="rId4"/>
-    <p:sldId id="288" r:id="rId5"/>
-    <p:sldId id="275" r:id="rId6"/>
-    <p:sldId id="276" r:id="rId7"/>
-    <p:sldId id="277" r:id="rId8"/>
-    <p:sldId id="278" r:id="rId9"/>
-    <p:sldId id="279" r:id="rId10"/>
-    <p:sldId id="280" r:id="rId11"/>
-    <p:sldId id="281" r:id="rId12"/>
-    <p:sldId id="282" r:id="rId13"/>
-    <p:sldId id="283" r:id="rId14"/>
-    <p:sldId id="284" r:id="rId15"/>
-    <p:sldId id="285" r:id="rId16"/>
-    <p:sldId id="286" r:id="rId17"/>
-    <p:sldId id="287" r:id="rId18"/>
+    <p:sldId id="289" r:id="rId4"/>
+    <p:sldId id="274" r:id="rId5"/>
+    <p:sldId id="288" r:id="rId6"/>
+    <p:sldId id="275" r:id="rId7"/>
+    <p:sldId id="276" r:id="rId8"/>
+    <p:sldId id="277" r:id="rId9"/>
+    <p:sldId id="278" r:id="rId10"/>
+    <p:sldId id="279" r:id="rId11"/>
+    <p:sldId id="280" r:id="rId12"/>
+    <p:sldId id="281" r:id="rId13"/>
+    <p:sldId id="282" r:id="rId14"/>
+    <p:sldId id="283" r:id="rId15"/>
+    <p:sldId id="284" r:id="rId16"/>
+    <p:sldId id="285" r:id="rId17"/>
+    <p:sldId id="286" r:id="rId18"/>
+    <p:sldId id="287" r:id="rId19"/>
   </p:sldIdLst>
   <p:sldSz cx="14630400" cy="8229600"/>
   <p:notesSz cx="6858000" cy="9144000"/>
@@ -128,6 +129,7 @@
       <p14:sectionLst xmlns:p14="http://schemas.microsoft.com/office/powerpoint/2010/main">
         <p14:section name="Default Section" id="{65A0AD92-78D2-7545-8A6E-2D1143DEE447}">
           <p14:sldIdLst>
+            <p14:sldId id="289"/>
             <p14:sldId id="274"/>
             <p14:sldId id="288"/>
             <p14:sldId id="275"/>
@@ -282,7 +284,7 @@
           <a:p>
             <a:fld id="{D3795B05-2543-AE48-B1B2-BBCFB868FD98}" type="datetimeFigureOut">
               <a:rPr lang="en-US" smtClean="0"/>
-              <a:t>3/12/17</a:t>
+              <a:t>3/20/17</a:t>
             </a:fld>
             <a:endParaRPr lang="en-US"/>
           </a:p>
@@ -631,7 +633,7 @@
           <a:p>
             <a:fld id="{966CA42E-DEAB-9A42-8E96-6BB697BA3B3F}" type="slidenum">
               <a:rPr lang="en-US" smtClean="0"/>
-              <a:t>2</a:t>
+              <a:t>3</a:t>
             </a:fld>
             <a:endParaRPr lang="en-US"/>
           </a:p>
@@ -749,7 +751,7 @@
                 <a:latin typeface="Calibri"/>
               </a:rPr>
               <a:pPr/>
-              <a:t>9</a:t>
+              <a:t>10</a:t>
             </a:fld>
             <a:endParaRPr lang="en-US">
               <a:solidFill>
@@ -1186,7 +1188,7 @@
           <a:p>
             <a:fld id="{966CA42E-DEAB-9A42-8E96-6BB697BA3B3F}" type="slidenum">
               <a:rPr lang="en-US" smtClean="0"/>
-              <a:t>15</a:t>
+              <a:t>16</a:t>
             </a:fld>
             <a:endParaRPr lang="en-US"/>
           </a:p>
@@ -10415,7 +10417,11 @@
           <a:p>
             <a:r>
               <a:rPr lang="en-US" dirty="0" smtClean="0"/>
-              <a:t>Learning Lab</a:t>
+              <a:t>Compliance Automation with </a:t>
+            </a:r>
+            <a:r>
+              <a:rPr lang="en-US" dirty="0" err="1" smtClean="0"/>
+              <a:t>InSpec</a:t>
             </a:r>
             <a:endParaRPr lang="en-US" dirty="0"/>
           </a:p>
@@ -10436,14 +10442,22 @@
           <a:bodyPr/>
           <a:lstStyle/>
           <a:p>
-            <a:endParaRPr lang="en-US"/>
+            <a:r>
+              <a:rPr lang="en-US" dirty="0" smtClean="0"/>
+              <a:t>Nathen Harvey - @</a:t>
+            </a:r>
+            <a:r>
+              <a:rPr lang="en-US" dirty="0" err="1" smtClean="0"/>
+              <a:t>nathenharvey</a:t>
+            </a:r>
+            <a:endParaRPr lang="en-US" dirty="0"/>
           </a:p>
         </p:txBody>
       </p:sp>
     </p:spTree>
     <p:extLst>
       <p:ext uri="{BB962C8B-B14F-4D97-AF65-F5344CB8AC3E}">
-        <p14:creationId xmlns:p14="http://schemas.microsoft.com/office/powerpoint/2010/main" val="219336031"/>
+        <p14:creationId xmlns:p14="http://schemas.microsoft.com/office/powerpoint/2010/main" val="968614994"/>
       </p:ext>
     </p:extLst>
   </p:cSld>
@@ -10462,13 +10476,6 @@
       </p:transition>
     </mc:Fallback>
   </mc:AlternateContent>
-  <p:timing>
-    <p:tnLst>
-      <p:par>
-        <p:cTn xmlns:p14="http://schemas.microsoft.com/office/powerpoint/2010/main" id="1" dur="indefinite" restart="never" nodeType="tmRoot"/>
-      </p:par>
-    </p:tnLst>
-  </p:timing>
 </p:sld>
 </file>
 
@@ -10506,7 +10513,7 @@
           <a:p>
             <a:r>
               <a:rPr lang="en-US" dirty="0" smtClean="0"/>
-              <a:t>Verify the installation</a:t>
+              <a:t>List your home directory</a:t>
             </a:r>
             <a:endParaRPr lang="en-US" dirty="0"/>
           </a:p>
@@ -10528,20 +10535,38 @@
           <a:lstStyle/>
           <a:p>
             <a:r>
+              <a:rPr lang="en-US" dirty="0" err="1"/>
+              <a:t>firstname-lastname</a:t>
+            </a:r>
+            <a:r>
               <a:rPr lang="en-US" dirty="0"/>
-              <a:t>/opt/</a:t>
+              <a:t>  cookbooks       </a:t>
             </a:r>
             <a:r>
               <a:rPr lang="en-US" dirty="0" err="1"/>
-              <a:t>chefdk</a:t>
+              <a:t>Berksfile</a:t>
             </a:r>
             <a:r>
               <a:rPr lang="en-US" dirty="0"/>
-              <a:t>/bin/</a:t>
+              <a:t>    profiles</a:t>
+            </a:r>
+          </a:p>
+          <a:p>
+            <a:r>
+              <a:rPr lang="en-US" dirty="0"/>
+              <a:t>nodes               </a:t>
             </a:r>
             <a:r>
               <a:rPr lang="en-US" dirty="0" err="1"/>
-              <a:t>inspec</a:t>
+              <a:t>Berksfile.lock</a:t>
+            </a:r>
+            <a:r>
+              <a:rPr lang="en-US" dirty="0"/>
+              <a:t>  </a:t>
+            </a:r>
+            <a:r>
+              <a:rPr lang="en-US" dirty="0" err="1"/>
+              <a:t>config.json</a:t>
             </a:r>
             <a:endParaRPr lang="en-US" dirty="0"/>
           </a:p>
@@ -10564,11 +10589,15 @@
           <a:p>
             <a:r>
               <a:rPr lang="en-US" dirty="0" smtClean="0"/>
-              <a:t>which </a:t>
+              <a:t>sleep 60 &amp;&amp; </a:t>
             </a:r>
             <a:r>
               <a:rPr lang="en-US" dirty="0" err="1" smtClean="0"/>
-              <a:t>inspec</a:t>
+              <a:t>ls</a:t>
+            </a:r>
+            <a:r>
+              <a:rPr lang="en-US" dirty="0" smtClean="0"/>
+              <a:t> -t</a:t>
             </a:r>
             <a:endParaRPr lang="en-US" dirty="0"/>
           </a:p>
@@ -10577,7 +10606,7 @@
     </p:spTree>
     <p:extLst>
       <p:ext uri="{BB962C8B-B14F-4D97-AF65-F5344CB8AC3E}">
-        <p14:creationId xmlns:p14="http://schemas.microsoft.com/office/powerpoint/2010/main" val="4063326046"/>
+        <p14:creationId xmlns:p14="http://schemas.microsoft.com/office/powerpoint/2010/main" val="1813720295"/>
       </p:ext>
     </p:extLst>
   </p:cSld>
@@ -10661,30 +10690,23 @@
           <a:bodyPr/>
           <a:lstStyle/>
           <a:p>
+            <a:r>
+              <a:rPr lang="en-US" dirty="0"/>
+              <a:t>/opt/</a:t>
+            </a:r>
+            <a:r>
+              <a:rPr lang="en-US" dirty="0" err="1"/>
+              <a:t>chefdk</a:t>
+            </a:r>
+            <a:r>
+              <a:rPr lang="en-US" dirty="0"/>
+              <a:t>/bin/</a:t>
+            </a:r>
+            <a:r>
+              <a:rPr lang="en-US" dirty="0" err="1"/>
+              <a:t>inspec</a:t>
+            </a:r>
             <a:endParaRPr lang="en-US" dirty="0"/>
-          </a:p>
-          <a:p>
-            <a:r>
-              <a:rPr lang="en-US" dirty="0"/>
-              <a:t>1.11.0</a:t>
-            </a:r>
-          </a:p>
-          <a:p>
-            <a:endParaRPr lang="en-US" dirty="0"/>
-          </a:p>
-          <a:p>
-            <a:r>
-              <a:rPr lang="en-US" dirty="0"/>
-              <a:t>Your version of </a:t>
-            </a:r>
-            <a:r>
-              <a:rPr lang="en-US" dirty="0" err="1"/>
-              <a:t>InSpec</a:t>
-            </a:r>
-            <a:r>
-              <a:rPr lang="en-US" dirty="0"/>
-              <a:t> is out of date! The latest version is 1.15.0.</a:t>
-            </a:r>
           </a:p>
         </p:txBody>
       </p:sp>
@@ -10704,12 +10726,12 @@
           <a:lstStyle/>
           <a:p>
             <a:r>
+              <a:rPr lang="en-US" dirty="0" smtClean="0"/>
+              <a:t>which </a:t>
+            </a:r>
+            <a:r>
               <a:rPr lang="en-US" dirty="0" err="1" smtClean="0"/>
               <a:t>inspec</a:t>
-            </a:r>
-            <a:r>
-              <a:rPr lang="en-US" dirty="0" smtClean="0"/>
-              <a:t> version</a:t>
             </a:r>
             <a:endParaRPr lang="en-US" dirty="0"/>
           </a:p>
@@ -10718,7 +10740,7 @@
     </p:spTree>
     <p:extLst>
       <p:ext uri="{BB962C8B-B14F-4D97-AF65-F5344CB8AC3E}">
-        <p14:creationId xmlns:p14="http://schemas.microsoft.com/office/powerpoint/2010/main" val="3692190969"/>
+        <p14:creationId xmlns:p14="http://schemas.microsoft.com/office/powerpoint/2010/main" val="4063326046"/>
       </p:ext>
     </p:extLst>
   </p:cSld>
@@ -10802,17 +10824,29 @@
           <a:bodyPr/>
           <a:lstStyle/>
           <a:p>
+            <a:endParaRPr lang="en-US" dirty="0"/>
+          </a:p>
+          <a:p>
             <a:r>
               <a:rPr lang="en-US" dirty="0"/>
-              <a:t>/opt/</a:t>
+              <a:t>1.11.0</a:t>
+            </a:r>
+          </a:p>
+          <a:p>
+            <a:endParaRPr lang="en-US" dirty="0"/>
+          </a:p>
+          <a:p>
+            <a:r>
+              <a:rPr lang="en-US" dirty="0"/>
+              <a:t>Your version of </a:t>
             </a:r>
             <a:r>
               <a:rPr lang="en-US" dirty="0" err="1"/>
-              <a:t>chefdk</a:t>
+              <a:t>InSpec</a:t>
             </a:r>
             <a:r>
               <a:rPr lang="en-US" dirty="0"/>
-              <a:t>/bin/chef</a:t>
+              <a:t> is out of date! The latest version is 1.15.0.</a:t>
             </a:r>
           </a:p>
         </p:txBody>
@@ -10833,8 +10867,12 @@
           <a:lstStyle/>
           <a:p>
             <a:r>
+              <a:rPr lang="en-US" dirty="0" err="1" smtClean="0"/>
+              <a:t>inspec</a:t>
+            </a:r>
+            <a:r>
               <a:rPr lang="en-US" dirty="0" smtClean="0"/>
-              <a:t>which chef</a:t>
+              <a:t> version</a:t>
             </a:r>
             <a:endParaRPr lang="en-US" dirty="0"/>
           </a:p>
@@ -10843,7 +10881,7 @@
     </p:spTree>
     <p:extLst>
       <p:ext uri="{BB962C8B-B14F-4D97-AF65-F5344CB8AC3E}">
-        <p14:creationId xmlns:p14="http://schemas.microsoft.com/office/powerpoint/2010/main" val="145069205"/>
+        <p14:creationId xmlns:p14="http://schemas.microsoft.com/office/powerpoint/2010/main" val="3692190969"/>
       </p:ext>
     </p:extLst>
   </p:cSld>
@@ -10929,6 +10967,131 @@
           <a:p>
             <a:r>
               <a:rPr lang="en-US" dirty="0"/>
+              <a:t>/opt/</a:t>
+            </a:r>
+            <a:r>
+              <a:rPr lang="en-US" dirty="0" err="1"/>
+              <a:t>chefdk</a:t>
+            </a:r>
+            <a:r>
+              <a:rPr lang="en-US" dirty="0"/>
+              <a:t>/bin/chef</a:t>
+            </a:r>
+          </a:p>
+        </p:txBody>
+      </p:sp>
+      <p:sp>
+        <p:nvSpPr>
+          <p:cNvPr id="4" name="Text Placeholder 3"/>
+          <p:cNvSpPr>
+            <a:spLocks noGrp="1"/>
+          </p:cNvSpPr>
+          <p:nvPr>
+            <p:ph type="body" sz="quarter" idx="12"/>
+          </p:nvPr>
+        </p:nvSpPr>
+        <p:spPr/>
+        <p:txBody>
+          <a:bodyPr/>
+          <a:lstStyle/>
+          <a:p>
+            <a:r>
+              <a:rPr lang="en-US" dirty="0" smtClean="0"/>
+              <a:t>which chef</a:t>
+            </a:r>
+            <a:endParaRPr lang="en-US" dirty="0"/>
+          </a:p>
+        </p:txBody>
+      </p:sp>
+    </p:spTree>
+    <p:extLst>
+      <p:ext uri="{BB962C8B-B14F-4D97-AF65-F5344CB8AC3E}">
+        <p14:creationId xmlns:p14="http://schemas.microsoft.com/office/powerpoint/2010/main" val="145069205"/>
+      </p:ext>
+    </p:extLst>
+  </p:cSld>
+  <p:clrMapOvr>
+    <a:masterClrMapping/>
+  </p:clrMapOvr>
+  <mc:AlternateContent xmlns:mc="http://schemas.openxmlformats.org/markup-compatibility/2006" xmlns:p14="http://schemas.microsoft.com/office/powerpoint/2010/main">
+    <mc:Choice Requires="p14">
+      <p:transition spd="med" p14:dur="700">
+        <p:fade/>
+      </p:transition>
+    </mc:Choice>
+    <mc:Fallback xmlns="">
+      <p:transition spd="med">
+        <p:fade/>
+      </p:transition>
+    </mc:Fallback>
+  </mc:AlternateContent>
+  <p:timing>
+    <p:tnLst>
+      <p:par>
+        <p:cTn xmlns:p14="http://schemas.microsoft.com/office/powerpoint/2010/main" id="1" dur="indefinite" restart="never" nodeType="tmRoot"/>
+      </p:par>
+    </p:tnLst>
+  </p:timing>
+</p:sld>
+</file>
+
+<file path=ppt/slides/slide14.xml><?xml version="1.0" encoding="utf-8"?>
+<p:sld xmlns:a="http://schemas.openxmlformats.org/drawingml/2006/main" xmlns:r="http://schemas.openxmlformats.org/officeDocument/2006/relationships" xmlns:p="http://schemas.openxmlformats.org/presentationml/2006/main">
+  <p:cSld>
+    <p:spTree>
+      <p:nvGrpSpPr>
+        <p:cNvPr id="1" name=""/>
+        <p:cNvGrpSpPr/>
+        <p:nvPr/>
+      </p:nvGrpSpPr>
+      <p:grpSpPr>
+        <a:xfrm>
+          <a:off x="0" y="0"/>
+          <a:ext cx="0" cy="0"/>
+          <a:chOff x="0" y="0"/>
+          <a:chExt cx="0" cy="0"/>
+        </a:xfrm>
+      </p:grpSpPr>
+      <p:sp>
+        <p:nvSpPr>
+          <p:cNvPr id="2" name="Title 1"/>
+          <p:cNvSpPr>
+            <a:spLocks noGrp="1"/>
+          </p:cNvSpPr>
+          <p:nvPr>
+            <p:ph type="title"/>
+          </p:nvPr>
+        </p:nvSpPr>
+        <p:spPr/>
+        <p:txBody>
+          <a:bodyPr/>
+          <a:lstStyle/>
+          <a:p>
+            <a:r>
+              <a:rPr lang="en-US" dirty="0" smtClean="0"/>
+              <a:t>Verify the installation</a:t>
+            </a:r>
+            <a:endParaRPr lang="en-US" dirty="0"/>
+          </a:p>
+        </p:txBody>
+      </p:sp>
+      <p:sp>
+        <p:nvSpPr>
+          <p:cNvPr id="3" name="Content Placeholder 2"/>
+          <p:cNvSpPr>
+            <a:spLocks noGrp="1"/>
+          </p:cNvSpPr>
+          <p:nvPr>
+            <p:ph sz="quarter" idx="11"/>
+          </p:nvPr>
+        </p:nvSpPr>
+        <p:spPr/>
+        <p:txBody>
+          <a:bodyPr/>
+          <a:lstStyle/>
+          <a:p>
+            <a:r>
+              <a:rPr lang="en-US" dirty="0"/>
               <a:t>Chef Development Kit Version: 1.2.22</a:t>
             </a:r>
           </a:p>
@@ -11013,7 +11176,7 @@
 </p:sld>
 </file>
 
-<file path=ppt/slides/slide14.xml><?xml version="1.0" encoding="utf-8"?>
+<file path=ppt/slides/slide15.xml><?xml version="1.0" encoding="utf-8"?>
 <p:sld xmlns:a="http://schemas.openxmlformats.org/drawingml/2006/main" xmlns:r="http://schemas.openxmlformats.org/officeDocument/2006/relationships" xmlns:p="http://schemas.openxmlformats.org/presentationml/2006/main">
   <p:cSld>
     <p:spTree>
@@ -12269,7 +12432,7 @@
 </p:sld>
 </file>
 
-<file path=ppt/slides/slide15.xml><?xml version="1.0" encoding="utf-8"?>
+<file path=ppt/slides/slide16.xml><?xml version="1.0" encoding="utf-8"?>
 <p:sld xmlns:a="http://schemas.openxmlformats.org/drawingml/2006/main" xmlns:r="http://schemas.openxmlformats.org/officeDocument/2006/relationships" xmlns:p="http://schemas.openxmlformats.org/presentationml/2006/main">
   <p:cSld>
     <p:spTree>
@@ -12336,8 +12499,8 @@
           </a:p>
           <a:p>
             <a:r>
-              <a:rPr lang="en-US" dirty="0" smtClean="0"/>
-              <a:t>#SLACK_CHANNEL_NAME</a:t>
+              <a:rPr lang="en-US" dirty="0"/>
+              <a:t>#CHANNEL-NAME</a:t>
             </a:r>
             <a:endParaRPr lang="en-US" dirty="0"/>
           </a:p>
@@ -12386,8 +12549,8 @@
           <a:lstStyle/>
           <a:p>
             <a:r>
-              <a:rPr lang="en-US" sz="4000" dirty="0" smtClean="0"/>
-              <a:t>#CHANNEL_NAME</a:t>
+              <a:rPr lang="en-US" sz="4000" dirty="0"/>
+              <a:t>#CHANNEL-NAME</a:t>
             </a:r>
             <a:endParaRPr lang="en-US" sz="4000" dirty="0"/>
           </a:p>
@@ -12444,12 +12607,12 @@
       </p:grpSpPr>
       <p:sp>
         <p:nvSpPr>
-          <p:cNvPr id="5" name="Title 4"/>
+          <p:cNvPr id="2" name="Title 1"/>
           <p:cNvSpPr>
             <a:spLocks noGrp="1"/>
           </p:cNvSpPr>
           <p:nvPr>
-            <p:ph type="title"/>
+            <p:ph type="ctrTitle"/>
           </p:nvPr>
         </p:nvSpPr>
         <p:spPr/>
@@ -12459,7 +12622,7 @@
           <a:p>
             <a:r>
               <a:rPr lang="en-US" dirty="0" smtClean="0"/>
-              <a:t>Join Slack Team &amp; Channel</a:t>
+              <a:t>Learning Lab</a:t>
             </a:r>
             <a:endParaRPr lang="en-US" dirty="0"/>
           </a:p>
@@ -12467,12 +12630,12 @@
       </p:sp>
       <p:sp>
         <p:nvSpPr>
-          <p:cNvPr id="2" name="Text Placeholder 1"/>
+          <p:cNvPr id="3" name="Subtitle 2"/>
           <p:cNvSpPr>
             <a:spLocks noGrp="1"/>
           </p:cNvSpPr>
           <p:nvPr>
-            <p:ph type="body" sz="quarter" idx="10"/>
+            <p:ph type="subTitle" idx="1"/>
           </p:nvPr>
         </p:nvSpPr>
         <p:spPr/>
@@ -12480,79 +12643,14 @@
           <a:bodyPr/>
           <a:lstStyle/>
           <a:p>
-            <a:r>
-              <a:rPr lang="en-US" dirty="0"/>
-              <a:t>http://community-</a:t>
-            </a:r>
-            <a:r>
-              <a:rPr lang="en-US" dirty="0" err="1" smtClean="0"/>
-              <a:t>slack.chef.io</a:t>
-            </a:r>
-            <a:endParaRPr lang="en-US" dirty="0" smtClean="0"/>
-          </a:p>
-          <a:p>
-            <a:r>
-              <a:rPr lang="en-US" dirty="0" smtClean="0"/>
-              <a:t>#SLACK_CHANNEL_NAME</a:t>
-            </a:r>
-            <a:endParaRPr lang="en-US" dirty="0"/>
-          </a:p>
-        </p:txBody>
-      </p:sp>
-      <p:pic>
-        <p:nvPicPr>
-          <p:cNvPr id="7" name="Shape 107"/>
-          <p:cNvPicPr preferRelativeResize="0">
-            <a:picLocks noGrp="1"/>
-          </p:cNvPicPr>
-          <p:nvPr>
-            <p:ph type="media" sz="quarter" idx="11"/>
-          </p:nvPr>
-        </p:nvPicPr>
-        <p:blipFill rotWithShape="1">
-          <a:blip r:embed="rId3">
-            <a:alphaModFix/>
-          </a:blip>
-          <a:srcRect t="3352" b="3352"/>
-          <a:stretch/>
-        </p:blipFill>
-        <p:spPr>
-          <a:prstGeom prst="rect">
-            <a:avLst/>
-          </a:prstGeom>
-          <a:noFill/>
-          <a:ln>
-            <a:noFill/>
-          </a:ln>
-        </p:spPr>
-      </p:pic>
-      <p:sp>
-        <p:nvSpPr>
-          <p:cNvPr id="3" name="Text Placeholder 2"/>
-          <p:cNvSpPr>
-            <a:spLocks noGrp="1"/>
-          </p:cNvSpPr>
-          <p:nvPr>
-            <p:ph type="body" sz="quarter" idx="12"/>
-          </p:nvPr>
-        </p:nvSpPr>
-        <p:spPr/>
-        <p:txBody>
-          <a:bodyPr/>
-          <a:lstStyle/>
-          <a:p>
-            <a:r>
-              <a:rPr lang="en-US" sz="4000" dirty="0" smtClean="0"/>
-              <a:t>#CHANNEL_NAME</a:t>
-            </a:r>
-            <a:endParaRPr lang="en-US" sz="4000" dirty="0"/>
+            <a:endParaRPr lang="en-US"/>
           </a:p>
         </p:txBody>
       </p:sp>
     </p:spTree>
     <p:extLst>
       <p:ext uri="{BB962C8B-B14F-4D97-AF65-F5344CB8AC3E}">
-        <p14:creationId xmlns:p14="http://schemas.microsoft.com/office/powerpoint/2010/main" val="1490259565"/>
+        <p14:creationId xmlns:p14="http://schemas.microsoft.com/office/powerpoint/2010/main" val="219336031"/>
       </p:ext>
     </p:extLst>
   </p:cSld>
@@ -12600,7 +12698,7 @@
       </p:grpSpPr>
       <p:sp>
         <p:nvSpPr>
-          <p:cNvPr id="2" name="Title 1"/>
+          <p:cNvPr id="5" name="Title 4"/>
           <p:cNvSpPr>
             <a:spLocks noGrp="1"/>
           </p:cNvSpPr>
@@ -12615,7 +12713,7 @@
           <a:p>
             <a:r>
               <a:rPr lang="en-US" dirty="0" smtClean="0"/>
-              <a:t>Find your IP Address</a:t>
+              <a:t>Join Slack Team &amp; Channel</a:t>
             </a:r>
             <a:endParaRPr lang="en-US" dirty="0"/>
           </a:p>
@@ -12623,7 +12721,7 @@
       </p:sp>
       <p:sp>
         <p:nvSpPr>
-          <p:cNvPr id="3" name="Text Placeholder 2"/>
+          <p:cNvPr id="2" name="Text Placeholder 1"/>
           <p:cNvSpPr>
             <a:spLocks noGrp="1"/>
           </p:cNvSpPr>
@@ -12636,14 +12734,79 @@
           <a:bodyPr/>
           <a:lstStyle/>
           <a:p>
-            <a:endParaRPr lang="en-US"/>
+            <a:r>
+              <a:rPr lang="en-US" dirty="0"/>
+              <a:t>http://community-</a:t>
+            </a:r>
+            <a:r>
+              <a:rPr lang="en-US" dirty="0" err="1" smtClean="0"/>
+              <a:t>slack.chef.io</a:t>
+            </a:r>
+            <a:endParaRPr lang="en-US" dirty="0" smtClean="0"/>
+          </a:p>
+          <a:p>
+            <a:r>
+              <a:rPr lang="en-US" dirty="0" smtClean="0"/>
+              <a:t>#CHANNEL-NAME</a:t>
+            </a:r>
+            <a:endParaRPr lang="en-US" dirty="0"/>
+          </a:p>
+        </p:txBody>
+      </p:sp>
+      <p:pic>
+        <p:nvPicPr>
+          <p:cNvPr id="7" name="Shape 107"/>
+          <p:cNvPicPr preferRelativeResize="0">
+            <a:picLocks noGrp="1"/>
+          </p:cNvPicPr>
+          <p:nvPr>
+            <p:ph type="media" sz="quarter" idx="11"/>
+          </p:nvPr>
+        </p:nvPicPr>
+        <p:blipFill rotWithShape="1">
+          <a:blip r:embed="rId3">
+            <a:alphaModFix/>
+          </a:blip>
+          <a:srcRect t="3352" b="3352"/>
+          <a:stretch/>
+        </p:blipFill>
+        <p:spPr>
+          <a:prstGeom prst="rect">
+            <a:avLst/>
+          </a:prstGeom>
+          <a:noFill/>
+          <a:ln>
+            <a:noFill/>
+          </a:ln>
+        </p:spPr>
+      </p:pic>
+      <p:sp>
+        <p:nvSpPr>
+          <p:cNvPr id="3" name="Text Placeholder 2"/>
+          <p:cNvSpPr>
+            <a:spLocks noGrp="1"/>
+          </p:cNvSpPr>
+          <p:nvPr>
+            <p:ph type="body" sz="quarter" idx="12"/>
+          </p:nvPr>
+        </p:nvSpPr>
+        <p:spPr/>
+        <p:txBody>
+          <a:bodyPr/>
+          <a:lstStyle/>
+          <a:p>
+            <a:r>
+              <a:rPr lang="en-US" sz="4000" dirty="0"/>
+              <a:t>#CHANNEL-NAME</a:t>
+            </a:r>
+            <a:endParaRPr lang="en-US" sz="4000" dirty="0"/>
           </a:p>
         </p:txBody>
       </p:sp>
     </p:spTree>
     <p:extLst>
       <p:ext uri="{BB962C8B-B14F-4D97-AF65-F5344CB8AC3E}">
-        <p14:creationId xmlns:p14="http://schemas.microsoft.com/office/powerpoint/2010/main" val="1125041348"/>
+        <p14:creationId xmlns:p14="http://schemas.microsoft.com/office/powerpoint/2010/main" val="1490259565"/>
       </p:ext>
     </p:extLst>
   </p:cSld>
@@ -12706,7 +12869,7 @@
           <a:p>
             <a:r>
               <a:rPr lang="en-US" dirty="0" smtClean="0"/>
-              <a:t>Login to remote workstation</a:t>
+              <a:t>Find your IP Address</a:t>
             </a:r>
             <a:endParaRPr lang="en-US" dirty="0"/>
           </a:p>
@@ -12714,12 +12877,12 @@
       </p:sp>
       <p:sp>
         <p:nvSpPr>
-          <p:cNvPr id="3" name="Content Placeholder 2"/>
+          <p:cNvPr id="3" name="Text Placeholder 2"/>
           <p:cNvSpPr>
             <a:spLocks noGrp="1"/>
           </p:cNvSpPr>
           <p:nvPr>
-            <p:ph sz="quarter" idx="11"/>
+            <p:ph type="body" sz="quarter" idx="10"/>
           </p:nvPr>
         </p:nvSpPr>
         <p:spPr/>
@@ -12727,60 +12890,14 @@
           <a:bodyPr/>
           <a:lstStyle/>
           <a:p>
-            <a:r>
-              <a:rPr lang="en-US" dirty="0"/>
-              <a:t>The authenticity of host '52.54.113.210 (52.54.113.210)' can't be established.</a:t>
-            </a:r>
-          </a:p>
-          <a:p>
-            <a:r>
-              <a:rPr lang="en-US" dirty="0"/>
-              <a:t>ECDSA key fingerprint is SHA256:zAtoeO29XbhRNvwg542cuh4qsKCEaX8hNIlEOCbgd3I.</a:t>
-            </a:r>
-          </a:p>
-          <a:p>
-            <a:r>
-              <a:rPr lang="en-US" dirty="0"/>
-              <a:t>Are you sure you want to continue connecting (yes/no)?</a:t>
-            </a:r>
-          </a:p>
-        </p:txBody>
-      </p:sp>
-      <p:sp>
-        <p:nvSpPr>
-          <p:cNvPr id="4" name="Text Placeholder 3"/>
-          <p:cNvSpPr>
-            <a:spLocks noGrp="1"/>
-          </p:cNvSpPr>
-          <p:nvPr>
-            <p:ph type="body" sz="quarter" idx="12"/>
-          </p:nvPr>
-        </p:nvSpPr>
-        <p:spPr/>
-        <p:txBody>
-          <a:bodyPr/>
-          <a:lstStyle/>
-          <a:p>
-            <a:r>
-              <a:rPr lang="en-US" dirty="0" err="1" smtClean="0"/>
-              <a:t>ssh</a:t>
-            </a:r>
-            <a:r>
-              <a:rPr lang="en-US" dirty="0" smtClean="0"/>
-              <a:t> </a:t>
-            </a:r>
-            <a:r>
-              <a:rPr lang="en-US" dirty="0" err="1" smtClean="0"/>
-              <a:t>chef@IP_ADDRESS</a:t>
-            </a:r>
-            <a:endParaRPr lang="en-US" dirty="0"/>
+            <a:endParaRPr lang="en-US"/>
           </a:p>
         </p:txBody>
       </p:sp>
     </p:spTree>
     <p:extLst>
       <p:ext uri="{BB962C8B-B14F-4D97-AF65-F5344CB8AC3E}">
-        <p14:creationId xmlns:p14="http://schemas.microsoft.com/office/powerpoint/2010/main" val="1675957479"/>
+        <p14:creationId xmlns:p14="http://schemas.microsoft.com/office/powerpoint/2010/main" val="1125041348"/>
       </p:ext>
     </p:extLst>
   </p:cSld>
@@ -12878,13 +12995,8 @@
           <a:p>
             <a:r>
               <a:rPr lang="en-US" dirty="0"/>
-              <a:t>Are you sure you want to continue connecting (yes/no)</a:t>
-            </a:r>
-            <a:r>
-              <a:rPr lang="en-US" dirty="0" smtClean="0"/>
-              <a:t>? yes</a:t>
-            </a:r>
-            <a:endParaRPr lang="en-US" dirty="0"/>
+              <a:t>Are you sure you want to continue connecting (yes/no)?</a:t>
+            </a:r>
           </a:p>
         </p:txBody>
       </p:sp>
@@ -12922,7 +13034,7 @@
     </p:spTree>
     <p:extLst>
       <p:ext uri="{BB962C8B-B14F-4D97-AF65-F5344CB8AC3E}">
-        <p14:creationId xmlns:p14="http://schemas.microsoft.com/office/powerpoint/2010/main" val="2127694308"/>
+        <p14:creationId xmlns:p14="http://schemas.microsoft.com/office/powerpoint/2010/main" val="1675957479"/>
       </p:ext>
     </p:extLst>
   </p:cSld>
@@ -13024,22 +13136,8 @@
             </a:r>
             <a:r>
               <a:rPr lang="en-US" dirty="0" smtClean="0"/>
-              <a:t>? Yes</a:t>
-            </a:r>
-          </a:p>
-          <a:p>
-            <a:r>
-              <a:rPr lang="en-US" dirty="0"/>
-              <a:t>Warning: Permanently added '52.54.113.210' (ECDSA) to the list of known hosts.</a:t>
-            </a:r>
-          </a:p>
-          <a:p>
-            <a:r>
-              <a:rPr lang="en-US" dirty="0"/>
-              <a:t>chef@52.54.113.210's password:</a:t>
-            </a:r>
-          </a:p>
-          <a:p>
+              <a:t>? yes</a:t>
+            </a:r>
             <a:endParaRPr lang="en-US" dirty="0"/>
           </a:p>
         </p:txBody>
@@ -13078,7 +13176,7 @@
     </p:spTree>
     <p:extLst>
       <p:ext uri="{BB962C8B-B14F-4D97-AF65-F5344CB8AC3E}">
-        <p14:creationId xmlns:p14="http://schemas.microsoft.com/office/powerpoint/2010/main" val="1471874171"/>
+        <p14:creationId xmlns:p14="http://schemas.microsoft.com/office/powerpoint/2010/main" val="2127694308"/>
       </p:ext>
     </p:extLst>
   </p:cSld>
@@ -13192,13 +13290,8 @@
           <a:p>
             <a:r>
               <a:rPr lang="en-US" dirty="0"/>
-              <a:t>chef@52.54.113.210's password</a:t>
-            </a:r>
-            <a:r>
-              <a:rPr lang="en-US" dirty="0" smtClean="0"/>
-              <a:t>: chef</a:t>
-            </a:r>
-            <a:endParaRPr lang="en-US" dirty="0"/>
+              <a:t>chef@52.54.113.210's password:</a:t>
+            </a:r>
           </a:p>
           <a:p>
             <a:endParaRPr lang="en-US" dirty="0"/>
@@ -13239,7 +13332,7 @@
     </p:spTree>
     <p:extLst>
       <p:ext uri="{BB962C8B-B14F-4D97-AF65-F5344CB8AC3E}">
-        <p14:creationId xmlns:p14="http://schemas.microsoft.com/office/powerpoint/2010/main" val="2781962769"/>
+        <p14:creationId xmlns:p14="http://schemas.microsoft.com/office/powerpoint/2010/main" val="1471874171"/>
       </p:ext>
     </p:extLst>
   </p:cSld>
@@ -13302,7 +13395,7 @@
           <a:p>
             <a:r>
               <a:rPr lang="en-US" dirty="0" smtClean="0"/>
-              <a:t>Touch a file with your name</a:t>
+              <a:t>Login to remote workstation</a:t>
             </a:r>
             <a:endParaRPr lang="en-US" dirty="0"/>
           </a:p>
@@ -13310,7 +13403,7 @@
       </p:sp>
       <p:sp>
         <p:nvSpPr>
-          <p:cNvPr id="5" name="Content Placeholder 4"/>
+          <p:cNvPr id="3" name="Content Placeholder 2"/>
           <p:cNvSpPr>
             <a:spLocks noGrp="1"/>
           </p:cNvSpPr>
@@ -13323,7 +13416,46 @@
           <a:bodyPr/>
           <a:lstStyle/>
           <a:p>
-            <a:endParaRPr lang="en-US"/>
+            <a:r>
+              <a:rPr lang="en-US" dirty="0"/>
+              <a:t>The authenticity of host '52.54.113.210 (52.54.113.210)' can't be established.</a:t>
+            </a:r>
+          </a:p>
+          <a:p>
+            <a:r>
+              <a:rPr lang="en-US" dirty="0"/>
+              <a:t>ECDSA key fingerprint is SHA256:zAtoeO29XbhRNvwg542cuh4qsKCEaX8hNIlEOCbgd3I.</a:t>
+            </a:r>
+          </a:p>
+          <a:p>
+            <a:r>
+              <a:rPr lang="en-US" dirty="0"/>
+              <a:t>Are you sure you want to continue connecting (yes/no)</a:t>
+            </a:r>
+            <a:r>
+              <a:rPr lang="en-US" dirty="0" smtClean="0"/>
+              <a:t>? Yes</a:t>
+            </a:r>
+          </a:p>
+          <a:p>
+            <a:r>
+              <a:rPr lang="en-US" dirty="0"/>
+              <a:t>Warning: Permanently added '52.54.113.210' (ECDSA) to the list of known hosts.</a:t>
+            </a:r>
+          </a:p>
+          <a:p>
+            <a:r>
+              <a:rPr lang="en-US" dirty="0"/>
+              <a:t>chef@52.54.113.210's password</a:t>
+            </a:r>
+            <a:r>
+              <a:rPr lang="en-US" dirty="0" smtClean="0"/>
+              <a:t>: chef</a:t>
+            </a:r>
+            <a:endParaRPr lang="en-US" dirty="0"/>
+          </a:p>
+          <a:p>
+            <a:endParaRPr lang="en-US" dirty="0"/>
           </a:p>
         </p:txBody>
       </p:sp>
@@ -13343,12 +13475,16 @@
           <a:lstStyle/>
           <a:p>
             <a:r>
+              <a:rPr lang="en-US" dirty="0" err="1" smtClean="0"/>
+              <a:t>ssh</a:t>
+            </a:r>
+            <a:r>
               <a:rPr lang="en-US" dirty="0" smtClean="0"/>
-              <a:t>touch </a:t>
+              <a:t> </a:t>
             </a:r>
             <a:r>
               <a:rPr lang="en-US" dirty="0" err="1" smtClean="0"/>
-              <a:t>firstname-lastname</a:t>
+              <a:t>chef@IP_ADDRESS</a:t>
             </a:r>
             <a:endParaRPr lang="en-US" dirty="0"/>
           </a:p>
@@ -13357,7 +13493,7 @@
     </p:spTree>
     <p:extLst>
       <p:ext uri="{BB962C8B-B14F-4D97-AF65-F5344CB8AC3E}">
-        <p14:creationId xmlns:p14="http://schemas.microsoft.com/office/powerpoint/2010/main" val="1613187398"/>
+        <p14:creationId xmlns:p14="http://schemas.microsoft.com/office/powerpoint/2010/main" val="2781962769"/>
       </p:ext>
     </p:extLst>
   </p:cSld>
@@ -13420,7 +13556,7 @@
           <a:p>
             <a:r>
               <a:rPr lang="en-US" dirty="0" smtClean="0"/>
-              <a:t>List your home directory</a:t>
+              <a:t>Touch a file with your name</a:t>
             </a:r>
             <a:endParaRPr lang="en-US" dirty="0"/>
           </a:p>
@@ -13428,7 +13564,7 @@
       </p:sp>
       <p:sp>
         <p:nvSpPr>
-          <p:cNvPr id="3" name="Content Placeholder 2"/>
+          <p:cNvPr id="5" name="Content Placeholder 4"/>
           <p:cNvSpPr>
             <a:spLocks noGrp="1"/>
           </p:cNvSpPr>
@@ -13441,41 +13577,7 @@
           <a:bodyPr/>
           <a:lstStyle/>
           <a:p>
-            <a:r>
-              <a:rPr lang="en-US" dirty="0" err="1"/>
-              <a:t>firstname-lastname</a:t>
-            </a:r>
-            <a:r>
-              <a:rPr lang="en-US" dirty="0"/>
-              <a:t>  cookbooks       </a:t>
-            </a:r>
-            <a:r>
-              <a:rPr lang="en-US" dirty="0" err="1"/>
-              <a:t>Berksfile</a:t>
-            </a:r>
-            <a:r>
-              <a:rPr lang="en-US" dirty="0"/>
-              <a:t>    profiles</a:t>
-            </a:r>
-          </a:p>
-          <a:p>
-            <a:r>
-              <a:rPr lang="en-US" dirty="0"/>
-              <a:t>nodes               </a:t>
-            </a:r>
-            <a:r>
-              <a:rPr lang="en-US" dirty="0" err="1"/>
-              <a:t>Berksfile.lock</a:t>
-            </a:r>
-            <a:r>
-              <a:rPr lang="en-US" dirty="0"/>
-              <a:t>  </a:t>
-            </a:r>
-            <a:r>
-              <a:rPr lang="en-US" dirty="0" err="1"/>
-              <a:t>config.json</a:t>
-            </a:r>
-            <a:endParaRPr lang="en-US" dirty="0"/>
+            <a:endParaRPr lang="en-US"/>
           </a:p>
         </p:txBody>
       </p:sp>
@@ -13496,15 +13598,11 @@
           <a:p>
             <a:r>
               <a:rPr lang="en-US" dirty="0" smtClean="0"/>
-              <a:t>sleep 60 &amp;&amp; </a:t>
+              <a:t>touch </a:t>
             </a:r>
             <a:r>
               <a:rPr lang="en-US" dirty="0" err="1" smtClean="0"/>
-              <a:t>ls</a:t>
-            </a:r>
-            <a:r>
-              <a:rPr lang="en-US" dirty="0" smtClean="0"/>
-              <a:t> -t</a:t>
+              <a:t>firstname-lastname</a:t>
             </a:r>
             <a:endParaRPr lang="en-US" dirty="0"/>
           </a:p>
@@ -13513,7 +13611,7 @@
     </p:spTree>
     <p:extLst>
       <p:ext uri="{BB962C8B-B14F-4D97-AF65-F5344CB8AC3E}">
-        <p14:creationId xmlns:p14="http://schemas.microsoft.com/office/powerpoint/2010/main" val="1813720295"/>
+        <p14:creationId xmlns:p14="http://schemas.microsoft.com/office/powerpoint/2010/main" val="1613187398"/>
       </p:ext>
     </p:extLst>
   </p:cSld>

</xml_diff>